<commit_message>
before sending to the site
</commit_message>
<xml_diff>
--- a/DbaseTesting.pptx
+++ b/DbaseTesting.pptx
@@ -9509,7 +9509,7 @@
           <a:p>
             <a:fld id="{EC0DF3D3-6BDF-454E-BD7B-257CB6720A5E}" type="datetime11">
               <a:rPr lang="en-US" smtClean="0"/>
-              <a:t>20:18:30</a:t>
+              <a:t>23:07:04</a:t>
             </a:fld>
             <a:endParaRPr lang="en-US" dirty="0"/>
           </a:p>
@@ -9707,7 +9707,7 @@
           <a:p>
             <a:fld id="{E5B678C6-0BA8-421F-921F-6B65E458163B}" type="datetime11">
               <a:rPr lang="en-US" smtClean="0"/>
-              <a:t>20:18:31</a:t>
+              <a:t>23:07:05</a:t>
             </a:fld>
             <a:endParaRPr lang="en-US" dirty="0"/>
           </a:p>
@@ -9915,7 +9915,7 @@
           <a:p>
             <a:fld id="{26C62F2E-527A-4D85-840E-1C3C7A3548DF}" type="datetime11">
               <a:rPr lang="en-US" smtClean="0"/>
-              <a:t>20:18:31</a:t>
+              <a:t>23:07:05</a:t>
             </a:fld>
             <a:endParaRPr lang="en-US" dirty="0"/>
           </a:p>
@@ -10126,7 +10126,7 @@
           <a:p>
             <a:fld id="{C6F9D492-1E6E-4290-89AF-43CFA1B9B110}" type="datetime11">
               <a:rPr lang="en-US" smtClean="0"/>
-              <a:t>20:18:31</a:t>
+              <a:t>23:07:05</a:t>
             </a:fld>
             <a:endParaRPr lang="en-US" dirty="0"/>
           </a:p>
@@ -10409,7 +10409,7 @@
           <a:p>
             <a:fld id="{CF29D22A-5489-402B-8C10-5D36CDCE1601}" type="datetime11">
               <a:rPr lang="en-US" smtClean="0"/>
-              <a:t>20:18:31</a:t>
+              <a:t>23:07:05</a:t>
             </a:fld>
             <a:endParaRPr lang="en-US" dirty="0"/>
           </a:p>
@@ -10674,7 +10674,7 @@
           <a:p>
             <a:fld id="{9AC4480C-5A02-454D-BB93-3497C9306AA9}" type="datetime11">
               <a:rPr lang="en-US" smtClean="0"/>
-              <a:t>20:18:31</a:t>
+              <a:t>23:07:05</a:t>
             </a:fld>
             <a:endParaRPr lang="en-US" dirty="0"/>
           </a:p>
@@ -11086,7 +11086,7 @@
           <a:p>
             <a:fld id="{45E661A6-E59E-4374-8D4F-B5A3D29A3452}" type="datetime11">
               <a:rPr lang="en-US" smtClean="0"/>
-              <a:t>20:18:31</a:t>
+              <a:t>23:07:05</a:t>
             </a:fld>
             <a:endParaRPr lang="en-US" dirty="0"/>
           </a:p>
@@ -11227,7 +11227,7 @@
           <a:p>
             <a:fld id="{A7E1DF95-5940-4137-9592-ABF9491B1D54}" type="datetime11">
               <a:rPr lang="en-US" smtClean="0"/>
-              <a:t>20:18:31</a:t>
+              <a:t>23:07:05</a:t>
             </a:fld>
             <a:endParaRPr lang="en-US" dirty="0"/>
           </a:p>
@@ -11340,7 +11340,7 @@
           <a:p>
             <a:fld id="{0C393338-0247-4DAF-B748-75C9C9CEBADA}" type="datetime11">
               <a:rPr lang="en-US" smtClean="0"/>
-              <a:t>20:18:31</a:t>
+              <a:t>23:07:05</a:t>
             </a:fld>
             <a:endParaRPr lang="en-US" dirty="0"/>
           </a:p>
@@ -11651,7 +11651,7 @@
           <a:p>
             <a:fld id="{D805FC4B-CBC6-4D81-880D-A0BE66ACADEB}" type="datetime11">
               <a:rPr lang="en-US" smtClean="0"/>
-              <a:t>20:18:31</a:t>
+              <a:t>23:07:05</a:t>
             </a:fld>
             <a:endParaRPr lang="en-US" dirty="0"/>
           </a:p>
@@ -11939,7 +11939,7 @@
           <a:p>
             <a:fld id="{A78DC593-E03F-4BC7-954A-271DE9AF240C}" type="datetime11">
               <a:rPr lang="en-US" smtClean="0"/>
-              <a:t>20:18:31</a:t>
+              <a:t>23:07:05</a:t>
             </a:fld>
             <a:endParaRPr lang="en-US" dirty="0"/>
           </a:p>
@@ -12189,7 +12189,7 @@
           <a:p>
             <a:fld id="{C05C4BE0-CE6D-4AEB-9CE4-D6250A65E8BB}" type="datetime11">
               <a:rPr lang="en-US" smtClean="0"/>
-              <a:t>20:18:30</a:t>
+              <a:t>23:07:04</a:t>
             </a:fld>
             <a:endParaRPr lang="en-US" dirty="0"/>
           </a:p>
@@ -13706,7 +13706,7 @@
                 <a:effectLst/>
                 <a:latin typeface="Segoe UI" panose="020B0502040204020203" pitchFamily="34" charset="0"/>
               </a:rPr>
-              <a:t>но и данные, необходимые для правильной работы приложения</a:t>
+              <a:t>но и данные, необходимые для правильной работы приложения.</a:t>
             </a:r>
             <a:endParaRPr lang="en-US" dirty="0"/>
           </a:p>
@@ -16730,7 +16730,7 @@
                 <a:latin typeface="Segoe UI" panose="020B0502040204020203" pitchFamily="34" charset="0"/>
                 <a:cs typeface="Segoe UI" panose="020B0502040204020203" pitchFamily="34" charset="0"/>
               </a:rPr>
-              <a:t>)</a:t>
+              <a:t>).</a:t>
             </a:r>
           </a:p>
           <a:p>
@@ -16745,7 +16745,7 @@
                 <a:latin typeface="Segoe UI" panose="020B0502040204020203" pitchFamily="34" charset="0"/>
                 <a:cs typeface="Segoe UI" panose="020B0502040204020203" pitchFamily="34" charset="0"/>
               </a:rPr>
-              <a:t>Миграции</a:t>
+              <a:t>Миграции.</a:t>
             </a:r>
             <a:br>
               <a:rPr lang="ru-RU" dirty="0"/>
@@ -19201,7 +19201,7 @@
                 <a:effectLst/>
                 <a:latin typeface="Segoe UI" panose="020B0502040204020203" pitchFamily="34" charset="0"/>
               </a:rPr>
-              <a:t>скрипты</a:t>
+              <a:t>скрипты.</a:t>
             </a:r>
           </a:p>
           <a:p>
@@ -19232,10 +19232,20 @@
                 </a:solidFill>
                 <a:latin typeface="Segoe UI" panose="020B0502040204020203" pitchFamily="34" charset="0"/>
               </a:rPr>
-              <a:t>ции</a:t>
-            </a:r>
-          </a:p>
-          <a:p>
+              <a:t>ции.</a:t>
+            </a:r>
+          </a:p>
+          <a:p>
+            <a:r>
+              <a:rPr lang="ru-RU" b="0" i="0" dirty="0" err="1">
+                <a:solidFill>
+                  <a:srgbClr val="000000"/>
+                </a:solidFill>
+                <a:effectLst/>
+                <a:latin typeface="Segoe UI" panose="020B0502040204020203" pitchFamily="34" charset="0"/>
+              </a:rPr>
+              <a:t>Flyway</a:t>
+            </a:r>
             <a:r>
               <a:rPr lang="ru-RU" b="0" i="0" dirty="0">
                 <a:solidFill>
@@ -19244,7 +19254,7 @@
                 <a:effectLst/>
                 <a:latin typeface="Segoe UI" panose="020B0502040204020203" pitchFamily="34" charset="0"/>
               </a:rPr>
-              <a:t>Flyway [https://flywaydb.org ]</a:t>
+              <a:t>.</a:t>
             </a:r>
           </a:p>
           <a:p>
@@ -19275,7 +19285,7 @@
                 <a:effectLst/>
                 <a:latin typeface="Segoe UI" panose="020B0502040204020203" pitchFamily="34" charset="0"/>
               </a:rPr>
-              <a:t>quibase </a:t>
+              <a:t>quibase</a:t>
             </a:r>
             <a:r>
               <a:rPr lang="ru-RU" b="0" i="0" dirty="0">
@@ -19285,7 +19295,7 @@
                 <a:effectLst/>
                 <a:latin typeface="Segoe UI" panose="020B0502040204020203" pitchFamily="34" charset="0"/>
               </a:rPr>
-              <a:t>[https://liquibase.org</a:t>
+              <a:t>.</a:t>
             </a:r>
             <a:endParaRPr lang="en-US" dirty="0"/>
           </a:p>
@@ -21165,7 +21175,7 @@
           </a:bodyPr>
           <a:lstStyle/>
           <a:p>
-            <a:pPr algn="just">
+            <a:pPr>
               <a:buFont typeface="Wingdings" panose="05000000000000000000" pitchFamily="2" charset="2"/>
               <a:buChar char="ü"/>
             </a:pPr>
@@ -21185,27 +21195,27 @@
             </a:r>
           </a:p>
           <a:p>
-            <a:pPr lvl="1" algn="just"/>
+            <a:pPr lvl="1"/>
             <a:r>
               <a:rPr lang="ru-RU" sz="3000" dirty="0">
                 <a:latin typeface="Segoe UI" panose="020B0502040204020203" pitchFamily="34" charset="0"/>
                 <a:cs typeface="Segoe UI" panose="020B0502040204020203" pitchFamily="34" charset="0"/>
               </a:rPr>
-              <a:t>База данных – управляемая зависимость, а значит деталь реализации</a:t>
-            </a:r>
-          </a:p>
-          <a:p>
-            <a:pPr lvl="1" algn="just"/>
+              <a:t>База данных – управляемая зависимость, а значит деталь реализации.</a:t>
+            </a:r>
+          </a:p>
+          <a:p>
+            <a:pPr lvl="1"/>
             <a:r>
               <a:rPr lang="ru-RU" sz="3000" dirty="0">
                 <a:latin typeface="Segoe UI" panose="020B0502040204020203" pitchFamily="34" charset="0"/>
                 <a:cs typeface="Segoe UI" panose="020B0502040204020203" pitchFamily="34" charset="0"/>
               </a:rPr>
-              <a:t>Необходимо выделять управляемую часть из неуправляемого взаимодействия с базой</a:t>
-            </a:r>
-          </a:p>
-          <a:p>
-            <a:pPr lvl="1" algn="just"/>
+              <a:t>Необходимо выделять управляемую часть из неуправляемого взаимодействия с базой.</a:t>
+            </a:r>
+          </a:p>
+          <a:p>
+            <a:pPr lvl="1"/>
             <a:r>
               <a:rPr lang="ru-RU" sz="3200" dirty="0">
                 <a:latin typeface="Segoe UI" panose="020B0502040204020203" pitchFamily="34" charset="0"/>
@@ -21232,11 +21242,11 @@
                 <a:latin typeface="Segoe UI" panose="020B0502040204020203" pitchFamily="34" charset="0"/>
                 <a:cs typeface="Segoe UI" panose="020B0502040204020203" pitchFamily="34" charset="0"/>
               </a:rPr>
-              <a:t> </a:t>
-            </a:r>
-          </a:p>
-          <a:p>
-            <a:pPr algn="just">
+              <a:t>.</a:t>
+            </a:r>
+          </a:p>
+          <a:p>
+            <a:pPr>
               <a:buFont typeface="Wingdings" panose="05000000000000000000" pitchFamily="2" charset="2"/>
               <a:buChar char="ü"/>
             </a:pPr>
@@ -21256,14 +21266,14 @@
             </a:r>
           </a:p>
           <a:p>
-            <a:pPr lvl="1" algn="just"/>
+            <a:pPr lvl="1"/>
             <a:r>
               <a:rPr lang="ru-RU" sz="3000" b="0" i="0" dirty="0">
                 <a:effectLst/>
                 <a:latin typeface="Segoe UI" panose="020B0502040204020203" pitchFamily="34" charset="0"/>
                 <a:cs typeface="Segoe UI" panose="020B0502040204020203" pitchFamily="34" charset="0"/>
               </a:rPr>
-              <a:t>Используйте миграции</a:t>
+              <a:t>Используйте миграции.</a:t>
             </a:r>
           </a:p>
           <a:p>
@@ -21289,7 +21299,7 @@
                 <a:latin typeface="Segoe UI" panose="020B0502040204020203" pitchFamily="34" charset="0"/>
                 <a:cs typeface="Segoe UI" panose="020B0502040204020203" pitchFamily="34" charset="0"/>
               </a:rPr>
-              <a:t>оздайте новую</a:t>
+              <a:t>оздайте новую.</a:t>
             </a:r>
           </a:p>
           <a:p>
@@ -21299,7 +21309,7 @@
                 <a:latin typeface="Segoe UI" panose="020B0502040204020203" pitchFamily="34" charset="0"/>
                 <a:cs typeface="Segoe UI" panose="020B0502040204020203" pitchFamily="34" charset="0"/>
               </a:rPr>
-              <a:t>И</a:t>
+              <a:t>Накатываем миграции специальными инструментами</a:t>
             </a:r>
             <a:r>
               <a:rPr lang="ru-RU" sz="3000" b="0" i="0" dirty="0">
@@ -21307,7 +21317,7 @@
                 <a:latin typeface="Segoe UI" panose="020B0502040204020203" pitchFamily="34" charset="0"/>
                 <a:cs typeface="Segoe UI" panose="020B0502040204020203" pitchFamily="34" charset="0"/>
               </a:rPr>
-              <a:t>сключения – возможная потеря данных</a:t>
+              <a:t>.</a:t>
             </a:r>
             <a:endParaRPr lang="en-US" sz="3000" dirty="0">
               <a:latin typeface="Segoe UI" panose="020B0502040204020203" pitchFamily="34" charset="0"/>
@@ -23339,7 +23349,7 @@
           </a:bodyPr>
           <a:lstStyle/>
           <a:p>
-            <a:pPr marL="0" indent="0" algn="just">
+            <a:pPr marL="0" indent="0">
               <a:buNone/>
             </a:pPr>
             <a:r>
@@ -23351,13 +23361,22 @@
             </a:r>
           </a:p>
           <a:p>
+            <a:r>
+              <a:rPr lang="ru-RU" dirty="0">
+                <a:latin typeface="Segoe UI" panose="020B0502040204020203" pitchFamily="34" charset="0"/>
+                <a:cs typeface="Segoe UI" panose="020B0502040204020203" pitchFamily="34" charset="0"/>
+              </a:rPr>
+              <a:t>Восстановление резервной копии базы данных перед каждым тестированием.</a:t>
+            </a:r>
+          </a:p>
+          <a:p>
             <a:pPr algn="just"/>
             <a:r>
               <a:rPr lang="ru-RU" dirty="0">
                 <a:latin typeface="Segoe UI" panose="020B0502040204020203" pitchFamily="34" charset="0"/>
                 <a:cs typeface="Segoe UI" panose="020B0502040204020203" pitchFamily="34" charset="0"/>
               </a:rPr>
-              <a:t>Восстановление резервной копии базы данных перед каждым тестированием</a:t>
+              <a:t>Оборачивание каждого теста в транзакцию.</a:t>
             </a:r>
           </a:p>
           <a:p>
@@ -23367,17 +23386,7 @@
                 <a:latin typeface="Segoe UI" panose="020B0502040204020203" pitchFamily="34" charset="0"/>
                 <a:cs typeface="Segoe UI" panose="020B0502040204020203" pitchFamily="34" charset="0"/>
               </a:rPr>
-              <a:t>Оборачивание каждого теста в транзакцию</a:t>
-            </a:r>
-          </a:p>
-          <a:p>
-            <a:pPr algn="just"/>
-            <a:r>
-              <a:rPr lang="ru-RU" dirty="0">
-                <a:latin typeface="Segoe UI" panose="020B0502040204020203" pitchFamily="34" charset="0"/>
-                <a:cs typeface="Segoe UI" panose="020B0502040204020203" pitchFamily="34" charset="0"/>
-              </a:rPr>
-              <a:t>Очистка данных в конце теста</a:t>
+              <a:t>Очистка данных в конце теста.</a:t>
             </a:r>
             <a:endParaRPr lang="en-US" dirty="0">
               <a:latin typeface="Segoe UI" panose="020B0502040204020203" pitchFamily="34" charset="0"/>
@@ -23391,7 +23400,7 @@
                 <a:latin typeface="Segoe UI" panose="020B0502040204020203" pitchFamily="34" charset="0"/>
                 <a:cs typeface="Segoe UI" panose="020B0502040204020203" pitchFamily="34" charset="0"/>
               </a:rPr>
-              <a:t>Очистка данных в начале теста</a:t>
+              <a:t>Очистка данных в начале теста.</a:t>
             </a:r>
             <a:endParaRPr lang="en-US" dirty="0">
               <a:latin typeface="Segoe UI" panose="020B0502040204020203" pitchFamily="34" charset="0"/>
@@ -23748,7 +23757,7 @@
                 <a:latin typeface="Segoe UI" panose="020B0502040204020203" pitchFamily="34" charset="0"/>
                 <a:cs typeface="Segoe UI" panose="020B0502040204020203" pitchFamily="34" charset="0"/>
               </a:rPr>
-              <a:t>Если база данных меняется не часто</a:t>
+              <a:t>Если база данных меняется не часто.</a:t>
             </a:r>
           </a:p>
           <a:p>
@@ -23773,6 +23782,17 @@
               </a:rPr>
               <a:t>production</a:t>
             </a:r>
+            <a:r>
+              <a:rPr lang="ru-RU" dirty="0">
+                <a:latin typeface="Segoe UI" panose="020B0502040204020203" pitchFamily="34" charset="0"/>
+                <a:cs typeface="Segoe UI" panose="020B0502040204020203" pitchFamily="34" charset="0"/>
+              </a:rPr>
+              <a:t>.</a:t>
+            </a:r>
+            <a:endParaRPr lang="en-US" dirty="0">
+              <a:latin typeface="Segoe UI" panose="020B0502040204020203" pitchFamily="34" charset="0"/>
+              <a:cs typeface="Segoe UI" panose="020B0502040204020203" pitchFamily="34" charset="0"/>
+            </a:endParaRPr>
           </a:p>
         </p:txBody>
       </p:sp>
@@ -26691,24 +26711,58 @@
               <a:t> </a:t>
             </a:r>
             <a:r>
-              <a:rPr lang="ru-RU" sz="2800" dirty="0"/>
+              <a:rPr lang="ru-RU" sz="2800" dirty="0">
+                <a:latin typeface="Segoe UI" panose="020B0502040204020203" pitchFamily="34" charset="0"/>
+                <a:cs typeface="Segoe UI" panose="020B0502040204020203" pitchFamily="34" charset="0"/>
+              </a:rPr>
               <a:t>Введение или о типах зависимостей</a:t>
             </a:r>
-            <a:endParaRPr lang="ru-RU" dirty="0"/>
+            <a:endParaRPr lang="ru-RU" dirty="0">
+              <a:latin typeface="Segoe UI" panose="020B0502040204020203" pitchFamily="34" charset="0"/>
+              <a:cs typeface="Segoe UI" panose="020B0502040204020203" pitchFamily="34" charset="0"/>
+            </a:endParaRPr>
           </a:p>
           <a:p>
             <a:pPr lvl="1"/>
             <a:r>
-              <a:rPr lang="ru-RU" dirty="0"/>
+              <a:rPr lang="ru-RU" dirty="0">
+                <a:latin typeface="Segoe UI" panose="020B0502040204020203" pitchFamily="34" charset="0"/>
+                <a:cs typeface="Segoe UI" panose="020B0502040204020203" pitchFamily="34" charset="0"/>
+              </a:rPr>
               <a:t>База данных – управляемая зависимость, а значит деталь реализации</a:t>
             </a:r>
+            <a:r>
+              <a:rPr lang="en-US" dirty="0">
+                <a:latin typeface="Segoe UI" panose="020B0502040204020203" pitchFamily="34" charset="0"/>
+                <a:cs typeface="Segoe UI" panose="020B0502040204020203" pitchFamily="34" charset="0"/>
+              </a:rPr>
+              <a:t>.</a:t>
+            </a:r>
+            <a:endParaRPr lang="ru-RU" dirty="0">
+              <a:latin typeface="Segoe UI" panose="020B0502040204020203" pitchFamily="34" charset="0"/>
+              <a:cs typeface="Segoe UI" panose="020B0502040204020203" pitchFamily="34" charset="0"/>
+            </a:endParaRPr>
           </a:p>
           <a:p>
             <a:pPr lvl="1"/>
             <a:r>
-              <a:rPr lang="ru-RU" dirty="0"/>
+              <a:rPr lang="ru-RU" dirty="0">
+                <a:latin typeface="Segoe UI" panose="020B0502040204020203" pitchFamily="34" charset="0"/>
+                <a:cs typeface="Segoe UI" panose="020B0502040204020203" pitchFamily="34" charset="0"/>
+              </a:rPr>
               <a:t>Необходимо выделять управляемую часть из неуправляемого взаимодействия с базой</a:t>
             </a:r>
+            <a:r>
+              <a:rPr lang="en-US" dirty="0">
+                <a:latin typeface="Segoe UI" panose="020B0502040204020203" pitchFamily="34" charset="0"/>
+                <a:cs typeface="Segoe UI" panose="020B0502040204020203" pitchFamily="34" charset="0"/>
+              </a:rPr>
+              <a:t>.</a:t>
+            </a:r>
+            <a:endParaRPr lang="ru-RU" dirty="0">
+              <a:latin typeface="Segoe UI" panose="020B0502040204020203" pitchFamily="34" charset="0"/>
+              <a:cs typeface="Segoe UI" panose="020B0502040204020203" pitchFamily="34" charset="0"/>
+            </a:endParaRPr>
           </a:p>
           <a:p>
             <a:pPr lvl="1"/>
@@ -26734,9 +26788,16 @@
               <a:t>)</a:t>
             </a:r>
             <a:r>
-              <a:rPr lang="ru-RU" dirty="0"/>
-              <a:t> </a:t>
-            </a:r>
+              <a:rPr lang="en-US" dirty="0">
+                <a:latin typeface="Segoe UI" panose="020B0502040204020203" pitchFamily="34" charset="0"/>
+                <a:cs typeface="Segoe UI" panose="020B0502040204020203" pitchFamily="34" charset="0"/>
+              </a:rPr>
+              <a:t>.</a:t>
+            </a:r>
+            <a:endParaRPr lang="ru-RU" dirty="0">
+              <a:latin typeface="Segoe UI" panose="020B0502040204020203" pitchFamily="34" charset="0"/>
+              <a:cs typeface="Segoe UI" panose="020B0502040204020203" pitchFamily="34" charset="0"/>
+            </a:endParaRPr>
           </a:p>
           <a:p>
             <a:pPr>
@@ -26744,11 +26805,17 @@
               <a:buChar char="ü"/>
             </a:pPr>
             <a:r>
-              <a:rPr lang="en-US" sz="2800" dirty="0"/>
+              <a:rPr lang="en-US" sz="2800" dirty="0">
+                <a:latin typeface="Segoe UI" panose="020B0502040204020203" pitchFamily="34" charset="0"/>
+                <a:cs typeface="Segoe UI" panose="020B0502040204020203" pitchFamily="34" charset="0"/>
+              </a:rPr>
               <a:t> </a:t>
             </a:r>
             <a:r>
-              <a:rPr lang="ru-RU" sz="2800" dirty="0"/>
+              <a:rPr lang="ru-RU" sz="2800" dirty="0">
+                <a:latin typeface="Segoe UI" panose="020B0502040204020203" pitchFamily="34" charset="0"/>
+                <a:cs typeface="Segoe UI" panose="020B0502040204020203" pitchFamily="34" charset="0"/>
+              </a:rPr>
               <a:t>Хранение схемы и доставка изменений</a:t>
             </a:r>
           </a:p>
@@ -26758,9 +26825,23 @@
               <a:rPr lang="ru-RU" b="0" i="0" dirty="0">
                 <a:effectLst/>
                 <a:latin typeface="Segoe UI" panose="020B0502040204020203" pitchFamily="34" charset="0"/>
+                <a:cs typeface="Segoe UI" panose="020B0502040204020203" pitchFamily="34" charset="0"/>
               </a:rPr>
               <a:t>Используйте миграции</a:t>
             </a:r>
+            <a:r>
+              <a:rPr lang="en-US" b="0" i="0" dirty="0">
+                <a:effectLst/>
+                <a:latin typeface="Segoe UI" panose="020B0502040204020203" pitchFamily="34" charset="0"/>
+                <a:cs typeface="Segoe UI" panose="020B0502040204020203" pitchFamily="34" charset="0"/>
+              </a:rPr>
+              <a:t>.</a:t>
+            </a:r>
+            <a:endParaRPr lang="ru-RU" b="0" i="0" dirty="0">
+              <a:effectLst/>
+              <a:latin typeface="Segoe UI" panose="020B0502040204020203" pitchFamily="34" charset="0"/>
+              <a:cs typeface="Segoe UI" panose="020B0502040204020203" pitchFamily="34" charset="0"/>
+            </a:endParaRPr>
           </a:p>
           <a:p>
             <a:pPr lvl="1"/>
@@ -26768,12 +26849,14 @@
               <a:rPr lang="ru-RU" b="0" i="0" dirty="0">
                 <a:effectLst/>
                 <a:latin typeface="Segoe UI" panose="020B0502040204020203" pitchFamily="34" charset="0"/>
+                <a:cs typeface="Segoe UI" panose="020B0502040204020203" pitchFamily="34" charset="0"/>
               </a:rPr>
               <a:t>Не изменяйте миграции. </a:t>
             </a:r>
             <a:r>
               <a:rPr lang="ru-RU" dirty="0">
                 <a:latin typeface="Segoe UI" panose="020B0502040204020203" pitchFamily="34" charset="0"/>
+                <a:cs typeface="Segoe UI" panose="020B0502040204020203" pitchFamily="34" charset="0"/>
               </a:rPr>
               <a:t>С</a:t>
             </a:r>
@@ -26781,26 +26864,45 @@
               <a:rPr lang="ru-RU" b="0" i="0" dirty="0">
                 <a:effectLst/>
                 <a:latin typeface="Segoe UI" panose="020B0502040204020203" pitchFamily="34" charset="0"/>
+                <a:cs typeface="Segoe UI" panose="020B0502040204020203" pitchFamily="34" charset="0"/>
               </a:rPr>
               <a:t>оздайте новую</a:t>
             </a:r>
+            <a:r>
+              <a:rPr lang="en-US" b="0" i="0" dirty="0">
+                <a:effectLst/>
+                <a:latin typeface="Segoe UI" panose="020B0502040204020203" pitchFamily="34" charset="0"/>
+                <a:cs typeface="Segoe UI" panose="020B0502040204020203" pitchFamily="34" charset="0"/>
+              </a:rPr>
+              <a:t>.</a:t>
+            </a:r>
+            <a:endParaRPr lang="ru-RU" b="0" i="0" dirty="0">
+              <a:effectLst/>
+              <a:latin typeface="Segoe UI" panose="020B0502040204020203" pitchFamily="34" charset="0"/>
+              <a:cs typeface="Segoe UI" panose="020B0502040204020203" pitchFamily="34" charset="0"/>
+            </a:endParaRPr>
           </a:p>
           <a:p>
             <a:pPr lvl="1"/>
             <a:r>
               <a:rPr lang="ru-RU" dirty="0">
                 <a:latin typeface="Segoe UI" panose="020B0502040204020203" pitchFamily="34" charset="0"/>
-              </a:rPr>
-              <a:t>И</a:t>
-            </a:r>
-            <a:r>
-              <a:rPr lang="ru-RU" b="0" i="0" dirty="0">
+                <a:cs typeface="Segoe UI" panose="020B0502040204020203" pitchFamily="34" charset="0"/>
+              </a:rPr>
+              <a:t>Накатываем миграции специальными инструментами</a:t>
+            </a:r>
+            <a:r>
+              <a:rPr lang="en-US" b="0" i="0" dirty="0">
                 <a:effectLst/>
                 <a:latin typeface="Segoe UI" panose="020B0502040204020203" pitchFamily="34" charset="0"/>
-              </a:rPr>
-              <a:t>сключения – возможная потеря данных</a:t>
-            </a:r>
-            <a:endParaRPr lang="en-US" dirty="0"/>
+                <a:cs typeface="Segoe UI" panose="020B0502040204020203" pitchFamily="34" charset="0"/>
+              </a:rPr>
+              <a:t>.</a:t>
+            </a:r>
+            <a:endParaRPr lang="en-US" dirty="0">
+              <a:latin typeface="Segoe UI" panose="020B0502040204020203" pitchFamily="34" charset="0"/>
+              <a:cs typeface="Segoe UI" panose="020B0502040204020203" pitchFamily="34" charset="0"/>
+            </a:endParaRPr>
           </a:p>
           <a:p>
             <a:pPr>
@@ -26808,28 +26910,65 @@
               <a:buChar char="ü"/>
             </a:pPr>
             <a:r>
-              <a:rPr lang="en-US" sz="2800" dirty="0"/>
+              <a:rPr lang="en-US" sz="2800" dirty="0">
+                <a:latin typeface="Segoe UI" panose="020B0502040204020203" pitchFamily="34" charset="0"/>
+                <a:cs typeface="Segoe UI" panose="020B0502040204020203" pitchFamily="34" charset="0"/>
+              </a:rPr>
               <a:t> </a:t>
             </a:r>
             <a:r>
-              <a:rPr lang="ru-RU" sz="2800" dirty="0"/>
+              <a:rPr lang="ru-RU" sz="2800" dirty="0">
+                <a:latin typeface="Segoe UI" panose="020B0502040204020203" pitchFamily="34" charset="0"/>
+                <a:cs typeface="Segoe UI" panose="020B0502040204020203" pitchFamily="34" charset="0"/>
+              </a:rPr>
               <a:t>Изоляция тестов</a:t>
             </a:r>
-            <a:endParaRPr lang="ru-RU" dirty="0"/>
+            <a:endParaRPr lang="ru-RU" dirty="0">
+              <a:latin typeface="Segoe UI" panose="020B0502040204020203" pitchFamily="34" charset="0"/>
+              <a:cs typeface="Segoe UI" panose="020B0502040204020203" pitchFamily="34" charset="0"/>
+            </a:endParaRPr>
           </a:p>
           <a:p>
             <a:pPr lvl="1"/>
             <a:r>
-              <a:rPr lang="ru-RU" dirty="0"/>
+              <a:rPr lang="ru-RU" dirty="0">
+                <a:latin typeface="Segoe UI" panose="020B0502040204020203" pitchFamily="34" charset="0"/>
+                <a:cs typeface="Segoe UI" panose="020B0502040204020203" pitchFamily="34" charset="0"/>
+              </a:rPr>
               <a:t>У каждого разработчика должна быть своя база</a:t>
             </a:r>
+            <a:r>
+              <a:rPr lang="en-US" dirty="0">
+                <a:latin typeface="Segoe UI" panose="020B0502040204020203" pitchFamily="34" charset="0"/>
+                <a:cs typeface="Segoe UI" panose="020B0502040204020203" pitchFamily="34" charset="0"/>
+              </a:rPr>
+              <a:t>.</a:t>
+            </a:r>
+            <a:endParaRPr lang="ru-RU" dirty="0">
+              <a:latin typeface="Segoe UI" panose="020B0502040204020203" pitchFamily="34" charset="0"/>
+              <a:cs typeface="Segoe UI" panose="020B0502040204020203" pitchFamily="34" charset="0"/>
+            </a:endParaRPr>
           </a:p>
           <a:p>
             <a:pPr lvl="1"/>
             <a:r>
-              <a:rPr lang="ru-RU" dirty="0"/>
+              <a:rPr lang="ru-RU" dirty="0">
+                <a:latin typeface="Segoe UI" panose="020B0502040204020203" pitchFamily="34" charset="0"/>
+                <a:cs typeface="Segoe UI" panose="020B0502040204020203" pitchFamily="34" charset="0"/>
+              </a:rPr>
               <a:t>Очищаем данные перед каждым тестом</a:t>
             </a:r>
+            <a:r>
+              <a:rPr lang="en-US" dirty="0">
+                <a:latin typeface="Segoe UI" panose="020B0502040204020203" pitchFamily="34" charset="0"/>
+                <a:cs typeface="Segoe UI" panose="020B0502040204020203" pitchFamily="34" charset="0"/>
+              </a:rPr>
+              <a:t>.</a:t>
+            </a:r>
+            <a:endParaRPr lang="ru-RU" dirty="0">
+              <a:latin typeface="Segoe UI" panose="020B0502040204020203" pitchFamily="34" charset="0"/>
+              <a:cs typeface="Segoe UI" panose="020B0502040204020203" pitchFamily="34" charset="0"/>
+            </a:endParaRPr>
           </a:p>
         </p:txBody>
       </p:sp>
@@ -28975,7 +29114,7 @@
                 <a:latin typeface="Segoe UI" panose="020B0502040204020203" pitchFamily="34" charset="0"/>
                 <a:cs typeface="Segoe UI" panose="020B0502040204020203" pitchFamily="34" charset="0"/>
               </a:rPr>
-              <a:t>Таблицы, которые видны другим – неуправляемые</a:t>
+              <a:t>Таблицы, которые видны другим – неуправляемые.</a:t>
             </a:r>
           </a:p>
           <a:p>
@@ -28990,7 +29129,7 @@
                 <a:latin typeface="Segoe UI" panose="020B0502040204020203" pitchFamily="34" charset="0"/>
                 <a:cs typeface="Segoe UI" panose="020B0502040204020203" pitchFamily="34" charset="0"/>
               </a:rPr>
-              <a:t>Остальные - управляемые</a:t>
+              <a:t>Остальные – управляемые.</a:t>
             </a:r>
             <a:endParaRPr lang="en-US" dirty="0">
               <a:latin typeface="Segoe UI" panose="020B0502040204020203" pitchFamily="34" charset="0"/>
@@ -34871,7 +35010,12 @@
             <p:ph idx="1"/>
           </p:nvPr>
         </p:nvSpPr>
-        <p:spPr/>
+        <p:spPr>
+          <a:xfrm>
+            <a:off x="838200" y="1831524"/>
+            <a:ext cx="10515600" cy="4351338"/>
+          </a:xfrm>
+        </p:spPr>
         <p:txBody>
           <a:bodyPr/>
           <a:lstStyle/>
@@ -34906,16 +35050,15 @@
                 <a:latin typeface="Segoe UI" panose="020B0502040204020203" pitchFamily="34" charset="0"/>
                 <a:cs typeface="Segoe UI" panose="020B0502040204020203" pitchFamily="34" charset="0"/>
               </a:rPr>
-              <a:t>ложно сделать идентично production</a:t>
-            </a:r>
-          </a:p>
-          <a:p>
-            <a:r>
-              <a:rPr lang="ru-RU" dirty="0">
+              <a:t>ложно сделать идентично </a:t>
+            </a:r>
+            <a:r>
+              <a:rPr lang="ru-RU" b="0" i="0" dirty="0" err="1">
+                <a:effectLst/>
                 <a:latin typeface="Segoe UI" panose="020B0502040204020203" pitchFamily="34" charset="0"/>
                 <a:cs typeface="Segoe UI" panose="020B0502040204020203" pitchFamily="34" charset="0"/>
               </a:rPr>
-              <a:t>М</a:t>
+              <a:t>production</a:t>
             </a:r>
             <a:r>
               <a:rPr lang="ru-RU" b="0" i="0" dirty="0">
@@ -34923,7 +35066,24 @@
                 <a:latin typeface="Segoe UI" panose="020B0502040204020203" pitchFamily="34" charset="0"/>
                 <a:cs typeface="Segoe UI" panose="020B0502040204020203" pitchFamily="34" charset="0"/>
               </a:rPr>
-              <a:t>едленнее</a:t>
+              <a:t>.</a:t>
+            </a:r>
+          </a:p>
+          <a:p>
+            <a:r>
+              <a:rPr lang="ru-RU" dirty="0">
+                <a:latin typeface="Segoe UI" panose="020B0502040204020203" pitchFamily="34" charset="0"/>
+                <a:cs typeface="Segoe UI" panose="020B0502040204020203" pitchFamily="34" charset="0"/>
+              </a:rPr>
+              <a:t>М</a:t>
+            </a:r>
+            <a:r>
+              <a:rPr lang="ru-RU" b="0" i="0" dirty="0">
+                <a:effectLst/>
+                <a:latin typeface="Segoe UI" panose="020B0502040204020203" pitchFamily="34" charset="0"/>
+                <a:cs typeface="Segoe UI" panose="020B0502040204020203" pitchFamily="34" charset="0"/>
+              </a:rPr>
+              <a:t>едленнее.</a:t>
             </a:r>
           </a:p>
           <a:p>
@@ -34974,7 +35134,7 @@
                 <a:latin typeface="Segoe UI" panose="020B0502040204020203" pitchFamily="34" charset="0"/>
                 <a:cs typeface="Segoe UI" panose="020B0502040204020203" pitchFamily="34" charset="0"/>
               </a:rPr>
-              <a:t>бою</a:t>
+              <a:t>бою.</a:t>
             </a:r>
           </a:p>
           <a:p>
@@ -34991,7 +35151,7 @@
                 <a:latin typeface="Segoe UI" panose="020B0502040204020203" pitchFamily="34" charset="0"/>
                 <a:cs typeface="Segoe UI" panose="020B0502040204020203" pitchFamily="34" charset="0"/>
               </a:rPr>
-              <a:t> ровно то, что надо</a:t>
+              <a:t> ровно то, что надо.</a:t>
             </a:r>
           </a:p>
           <a:p>
@@ -36391,7 +36551,6 @@
           </a:bodyPr>
           <a:lstStyle/>
           <a:p>
-            <a:pPr algn="just"/>
             <a:r>
               <a:rPr lang="ru-RU" dirty="0">
                 <a:latin typeface="Segoe UI" panose="020B0502040204020203" pitchFamily="34" charset="0"/>
@@ -36417,7 +36576,7 @@
                 <a:effectLst/>
                 <a:latin typeface="Segoe UI" panose="020B0502040204020203" pitchFamily="34" charset="0"/>
               </a:rPr>
-              <a:t>-контейнере.</a:t>
+              <a:t>-контейнерах.</a:t>
             </a:r>
           </a:p>
           <a:p>
@@ -37317,12 +37476,11 @@
             </a:endParaRPr>
           </a:p>
           <a:p>
-            <a:pPr algn="just"/>
             <a:r>
               <a:rPr lang="ru-RU" dirty="0">
                 <a:latin typeface="Segoe UI" panose="020B0502040204020203" pitchFamily="34" charset="0"/>
               </a:rPr>
-              <a:t>множество нюансов уже реализованных в готовых инструментах</a:t>
+              <a:t>Множество нюансов уже реализованных в готовых инструментах.</a:t>
             </a:r>
           </a:p>
           <a:p>
@@ -37364,7 +37522,7 @@
               <a:rPr lang="ru-RU" dirty="0">
                 <a:latin typeface="Segoe UI" panose="020B0502040204020203" pitchFamily="34" charset="0"/>
               </a:rPr>
-              <a:t>полное управление</a:t>
+              <a:t>Полное управление.</a:t>
             </a:r>
             <a:endParaRPr lang="en-US" dirty="0">
               <a:latin typeface="Segoe UI" panose="020B0502040204020203" pitchFamily="34" charset="0"/>
@@ -38851,7 +39009,7 @@
                 <a:latin typeface="Segoe UI" panose="020B0502040204020203" pitchFamily="34" charset="0"/>
                 <a:cs typeface="Segoe UI" panose="020B0502040204020203" pitchFamily="34" charset="0"/>
               </a:rPr>
-              <a:t>База данных – управляемая зависимость, а значит деталь реализации</a:t>
+              <a:t>База данных – управляемая зависимость, а значит деталь реализации.</a:t>
             </a:r>
           </a:p>
           <a:p>
@@ -38886,7 +39044,7 @@
                 <a:latin typeface="Segoe UI" panose="020B0502040204020203" pitchFamily="34" charset="0"/>
                 <a:cs typeface="Segoe UI" panose="020B0502040204020203" pitchFamily="34" charset="0"/>
               </a:rPr>
-              <a:t>Необходимо выделять управляемую часть из неуправляемого взаимодействия с базой</a:t>
+              <a:t>Необходимо выделять управляемую часть из неуправляемого взаимодействия с базой.</a:t>
             </a:r>
           </a:p>
           <a:p>
@@ -38910,7 +39068,7 @@
                 <a:latin typeface="Segoe UI" panose="020B0502040204020203" pitchFamily="34" charset="0"/>
                 <a:cs typeface="Segoe UI" panose="020B0502040204020203" pitchFamily="34" charset="0"/>
               </a:rPr>
-              <a:t>) </a:t>
+              <a:t>).</a:t>
             </a:r>
             <a:endParaRPr lang="en-US" sz="2000" dirty="0">
               <a:latin typeface="Segoe UI" panose="020B0502040204020203" pitchFamily="34" charset="0"/>
@@ -38967,7 +39125,7 @@
                 <a:ea typeface="+mn-ea"/>
                 <a:cs typeface="+mn-cs"/>
               </a:rPr>
-              <a:t>Хранение схемы и доставка изменений</a:t>
+              <a:t>Хранение схемы и доставка изменений.</a:t>
             </a:r>
           </a:p>
           <a:p>
@@ -39003,7 +39161,7 @@
                 <a:ea typeface="+mn-ea"/>
                 <a:cs typeface="+mn-cs"/>
               </a:rPr>
-              <a:t>Используйте миграции</a:t>
+              <a:t>Используйте миграции.</a:t>
             </a:r>
           </a:p>
           <a:p>
@@ -39039,44 +39197,34 @@
                 <a:ea typeface="+mn-ea"/>
                 <a:cs typeface="+mn-cs"/>
               </a:rPr>
-              <a:t>Не изменяйте миграции. Создайте новую</a:t>
-            </a:r>
-          </a:p>
-          <a:p>
-            <a:pPr marL="685800" marR="0" lvl="1" indent="-228600" algn="l" defTabSz="914400" rtl="0" eaLnBrk="1" fontAlgn="auto" latinLnBrk="0" hangingPunct="1">
-              <a:lnSpc>
-                <a:spcPct val="90000"/>
-              </a:lnSpc>
-              <a:spcBef>
-                <a:spcPts val="500"/>
-              </a:spcBef>
-              <a:spcAft>
-                <a:spcPts val="0"/>
-              </a:spcAft>
-              <a:buClrTx/>
-              <a:buSzTx/>
-              <a:buFont typeface="Arial" panose="020B0604020202020204" pitchFamily="34" charset="0"/>
-              <a:buChar char="•"/>
-              <a:tabLst/>
+              <a:t>Не изменяйте миграции. Создайте новую.</a:t>
+            </a:r>
+          </a:p>
+          <a:p>
+            <a:pPr lvl="1">
               <a:defRPr/>
             </a:pPr>
             <a:r>
-              <a:rPr kumimoji="0" lang="ru-RU" sz="2000" b="0" i="0" u="none" strike="noStrike" kern="1200" cap="none" spc="0" normalizeH="0" baseline="0" noProof="0" dirty="0">
-                <a:ln>
-                  <a:noFill/>
-                </a:ln>
-                <a:solidFill>
-                  <a:prstClr val="black"/>
-                </a:solidFill>
-                <a:effectLst/>
-                <a:uLnTx/>
-                <a:uFillTx/>
-                <a:latin typeface="Segoe UI" panose="020B0502040204020203" pitchFamily="34" charset="0"/>
-                <a:ea typeface="+mn-ea"/>
-                <a:cs typeface="+mn-cs"/>
-              </a:rPr>
-              <a:t>Исключения – возможная потеря данных</a:t>
-            </a:r>
+              <a:rPr lang="ru-RU" sz="2000" dirty="0">
+                <a:latin typeface="Segoe UI" panose="020B0502040204020203" pitchFamily="34" charset="0"/>
+                <a:cs typeface="Segoe UI" panose="020B0502040204020203" pitchFamily="34" charset="0"/>
+              </a:rPr>
+              <a:t>Накатывайте миграции специальными инструментами.</a:t>
+            </a:r>
+            <a:endParaRPr kumimoji="0" lang="ru-RU" sz="2000" b="0" i="0" u="none" strike="noStrike" kern="1200" cap="none" spc="0" normalizeH="0" baseline="0" noProof="0" dirty="0">
+              <a:ln>
+                <a:noFill/>
+              </a:ln>
+              <a:solidFill>
+                <a:prstClr val="black"/>
+              </a:solidFill>
+              <a:effectLst/>
+              <a:uLnTx/>
+              <a:uFillTx/>
+              <a:latin typeface="Segoe UI" panose="020B0502040204020203" pitchFamily="34" charset="0"/>
+              <a:ea typeface="+mn-ea"/>
+              <a:cs typeface="+mn-cs"/>
+            </a:endParaRPr>
           </a:p>
           <a:p>
             <a:pPr>
@@ -39092,14 +39240,14 @@
             <a:pPr lvl="1"/>
             <a:r>
               <a:rPr lang="ru-RU" dirty="0"/>
-              <a:t>У каждого разработчика должна быть своя база</a:t>
+              <a:t>У каждого разработчика должна быть своя база.</a:t>
             </a:r>
           </a:p>
           <a:p>
             <a:pPr lvl="1"/>
             <a:r>
               <a:rPr lang="ru-RU" dirty="0"/>
-              <a:t>Очищаем данные перед каждым тестом</a:t>
+              <a:t>Очищаем данные перед каждым тестом.</a:t>
             </a:r>
             <a:endParaRPr kumimoji="0" lang="en-US" sz="2000" b="0" i="0" u="none" strike="noStrike" kern="1200" cap="none" spc="0" normalizeH="0" baseline="0" noProof="0" dirty="0">
               <a:ln>
@@ -39170,17 +39318,14 @@
               </a:rPr>
               <a:t>Respawn</a:t>
             </a:r>
-          </a:p>
-          <a:p>
-            <a:pPr lvl="1"/>
-            <a:r>
-              <a:rPr lang="ru-RU" sz="2000" dirty="0" err="1">
+            <a:r>
+              <a:rPr lang="ru-RU" sz="2000" dirty="0">
                 <a:latin typeface="Segoe UI" panose="020B0502040204020203" pitchFamily="34" charset="0"/>
                 <a:cs typeface="Segoe UI" panose="020B0502040204020203" pitchFamily="34" charset="0"/>
               </a:rPr>
-              <a:t>EfCore.TestSupport</a:t>
-            </a:r>
-            <a:endParaRPr lang="ru-RU" sz="2000" dirty="0">
+              <a:t>.</a:t>
+            </a:r>
+            <a:endParaRPr lang="en-US" sz="2000" dirty="0">
               <a:latin typeface="Segoe UI" panose="020B0502040204020203" pitchFamily="34" charset="0"/>
               <a:cs typeface="Segoe UI" panose="020B0502040204020203" pitchFamily="34" charset="0"/>
             </a:endParaRPr>
@@ -39188,6 +39333,23 @@
           <a:p>
             <a:pPr lvl="1"/>
             <a:r>
+              <a:rPr lang="ru-RU" sz="2000" dirty="0" err="1">
+                <a:latin typeface="Segoe UI" panose="020B0502040204020203" pitchFamily="34" charset="0"/>
+                <a:cs typeface="Segoe UI" panose="020B0502040204020203" pitchFamily="34" charset="0"/>
+              </a:rPr>
+              <a:t>EfCore.TestSupport</a:t>
+            </a:r>
+            <a:r>
+              <a:rPr lang="ru-RU" sz="2000" dirty="0">
+                <a:latin typeface="Segoe UI" panose="020B0502040204020203" pitchFamily="34" charset="0"/>
+                <a:cs typeface="Segoe UI" panose="020B0502040204020203" pitchFamily="34" charset="0"/>
+              </a:rPr>
+              <a:t>.</a:t>
+            </a:r>
+          </a:p>
+          <a:p>
+            <a:pPr lvl="1"/>
+            <a:r>
               <a:rPr lang="en-US" sz="2000" dirty="0" err="1">
                 <a:latin typeface="Segoe UI" panose="020B0502040204020203" pitchFamily="34" charset="0"/>
                 <a:cs typeface="Segoe UI" panose="020B0502040204020203" pitchFamily="34" charset="0"/>
@@ -39201,10 +39363,13 @@
               </a:rPr>
               <a:t>-dotnet</a:t>
             </a:r>
-            <a:endParaRPr lang="ru-RU" sz="2000" dirty="0">
-              <a:latin typeface="Segoe UI" panose="020B0502040204020203" pitchFamily="34" charset="0"/>
-              <a:cs typeface="Segoe UI" panose="020B0502040204020203" pitchFamily="34" charset="0"/>
-            </a:endParaRPr>
+            <a:r>
+              <a:rPr lang="ru-RU" sz="2000" dirty="0">
+                <a:latin typeface="Segoe UI" panose="020B0502040204020203" pitchFamily="34" charset="0"/>
+                <a:cs typeface="Segoe UI" panose="020B0502040204020203" pitchFamily="34" charset="0"/>
+              </a:rPr>
+              <a:t>.</a:t>
+            </a:r>
           </a:p>
         </p:txBody>
       </p:sp>
@@ -39801,7 +39966,7 @@
           <a:bodyPr/>
           <a:lstStyle/>
           <a:p>
-            <a:pPr marL="0" indent="0" algn="just">
+            <a:pPr marL="0" indent="0">
               <a:buNone/>
             </a:pPr>
             <a:r>
@@ -40949,7 +41114,7 @@
                 <a:latin typeface="Segoe UI" panose="020B0502040204020203" pitchFamily="34" charset="0"/>
                 <a:cs typeface="Segoe UI" panose="020B0502040204020203" pitchFamily="34" charset="0"/>
               </a:rPr>
-              <a:t>База данных – управляемая зависимость, а значит деталь реализации</a:t>
+              <a:t>База данных – управляемая зависимость, а значит деталь реализации.</a:t>
             </a:r>
           </a:p>
           <a:p>
@@ -40984,7 +41149,7 @@
                 <a:latin typeface="Segoe UI" panose="020B0502040204020203" pitchFamily="34" charset="0"/>
                 <a:cs typeface="Segoe UI" panose="020B0502040204020203" pitchFamily="34" charset="0"/>
               </a:rPr>
-              <a:t>Необходимо выделять управляемую часть из неуправляемого взаимодействия с базой</a:t>
+              <a:t>Необходимо выделять управляемую часть из неуправляемого взаимодействия с базой.</a:t>
             </a:r>
           </a:p>
           <a:p>
@@ -41008,7 +41173,7 @@
                 <a:latin typeface="Segoe UI" panose="020B0502040204020203" pitchFamily="34" charset="0"/>
                 <a:cs typeface="Segoe UI" panose="020B0502040204020203" pitchFamily="34" charset="0"/>
               </a:rPr>
-              <a:t>) </a:t>
+              <a:t>).</a:t>
             </a:r>
             <a:endParaRPr lang="en-US" sz="2000" dirty="0">
               <a:latin typeface="Segoe UI" panose="020B0502040204020203" pitchFamily="34" charset="0"/>
@@ -41101,7 +41266,7 @@
                 <a:ea typeface="+mn-ea"/>
                 <a:cs typeface="+mn-cs"/>
               </a:rPr>
-              <a:t>Используйте миграции</a:t>
+              <a:t>Используйте миграции.</a:t>
             </a:r>
           </a:p>
           <a:p>
@@ -41137,8 +41302,200 @@
                 <a:ea typeface="+mn-ea"/>
                 <a:cs typeface="+mn-cs"/>
               </a:rPr>
-              <a:t>Не изменяйте миграции. Создайте новую</a:t>
-            </a:r>
+              <a:t>Не изменяйте миграции. Создайте новую.</a:t>
+            </a:r>
+          </a:p>
+          <a:p>
+            <a:pPr lvl="1">
+              <a:defRPr/>
+            </a:pPr>
+            <a:r>
+              <a:rPr lang="ru-RU" sz="2000" dirty="0">
+                <a:latin typeface="Segoe UI" panose="020B0502040204020203" pitchFamily="34" charset="0"/>
+                <a:cs typeface="Segoe UI" panose="020B0502040204020203" pitchFamily="34" charset="0"/>
+              </a:rPr>
+              <a:t>Накатываем миграции специальными инструментами.</a:t>
+            </a:r>
+            <a:endParaRPr kumimoji="0" lang="ru-RU" sz="2000" b="0" i="0" u="none" strike="noStrike" kern="1200" cap="none" spc="0" normalizeH="0" baseline="0" noProof="0" dirty="0">
+              <a:ln>
+                <a:noFill/>
+              </a:ln>
+              <a:solidFill>
+                <a:prstClr val="black"/>
+              </a:solidFill>
+              <a:effectLst/>
+              <a:uLnTx/>
+              <a:uFillTx/>
+              <a:latin typeface="Segoe UI" panose="020B0502040204020203" pitchFamily="34" charset="0"/>
+              <a:ea typeface="+mn-ea"/>
+              <a:cs typeface="+mn-cs"/>
+            </a:endParaRPr>
+          </a:p>
+          <a:p>
+            <a:pPr>
+              <a:buFont typeface="Wingdings" panose="05000000000000000000" pitchFamily="2" charset="2"/>
+              <a:buChar char="ü"/>
+            </a:pPr>
+            <a:r>
+              <a:rPr lang="ru-RU" dirty="0"/>
+              <a:t>Изоляция тестов</a:t>
+            </a:r>
+          </a:p>
+          <a:p>
+            <a:pPr lvl="1"/>
+            <a:r>
+              <a:rPr lang="ru-RU" dirty="0"/>
+              <a:t>У каждого разработчика должна быть своя база.</a:t>
+            </a:r>
+          </a:p>
+          <a:p>
+            <a:pPr lvl="1"/>
+            <a:r>
+              <a:rPr lang="ru-RU" dirty="0"/>
+              <a:t>Очищаем данные перед каждым тестом.</a:t>
+            </a:r>
+            <a:endParaRPr lang="en-US" dirty="0"/>
+          </a:p>
+          <a:p>
+            <a:pPr>
+              <a:buFont typeface="Wingdings" panose="05000000000000000000" pitchFamily="2" charset="2"/>
+              <a:buChar char="ü"/>
+              <a:defRPr/>
+            </a:pPr>
+            <a:r>
+              <a:rPr lang="ru-RU" sz="2400" dirty="0">
+                <a:latin typeface="Segoe UI" panose="020B0502040204020203" pitchFamily="34" charset="0"/>
+                <a:cs typeface="Segoe UI" panose="020B0502040204020203" pitchFamily="34" charset="0"/>
+              </a:rPr>
+              <a:t>Библиотеки</a:t>
+            </a:r>
+            <a:endParaRPr lang="ru-RU" sz="2400" dirty="0">
+              <a:solidFill>
+                <a:prstClr val="black"/>
+              </a:solidFill>
+            </a:endParaRPr>
+          </a:p>
+          <a:p>
+            <a:pPr lvl="1"/>
+            <a:r>
+              <a:rPr lang="en-US" sz="2000" dirty="0">
+                <a:latin typeface="Segoe UI" panose="020B0502040204020203" pitchFamily="34" charset="0"/>
+                <a:cs typeface="Segoe UI" panose="020B0502040204020203" pitchFamily="34" charset="0"/>
+              </a:rPr>
+              <a:t>Respawn</a:t>
+            </a:r>
+            <a:r>
+              <a:rPr lang="ru-RU" sz="2000" dirty="0">
+                <a:latin typeface="Segoe UI" panose="020B0502040204020203" pitchFamily="34" charset="0"/>
+                <a:cs typeface="Segoe UI" panose="020B0502040204020203" pitchFamily="34" charset="0"/>
+              </a:rPr>
+              <a:t>.</a:t>
+            </a:r>
+            <a:endParaRPr lang="en-US" sz="2000" dirty="0">
+              <a:latin typeface="Segoe UI" panose="020B0502040204020203" pitchFamily="34" charset="0"/>
+              <a:cs typeface="Segoe UI" panose="020B0502040204020203" pitchFamily="34" charset="0"/>
+            </a:endParaRPr>
+          </a:p>
+          <a:p>
+            <a:pPr lvl="1"/>
+            <a:r>
+              <a:rPr lang="ru-RU" sz="2000" dirty="0" err="1">
+                <a:latin typeface="Segoe UI" panose="020B0502040204020203" pitchFamily="34" charset="0"/>
+                <a:cs typeface="Segoe UI" panose="020B0502040204020203" pitchFamily="34" charset="0"/>
+              </a:rPr>
+              <a:t>EfCore.TestSupport</a:t>
+            </a:r>
+            <a:r>
+              <a:rPr lang="ru-RU" sz="2000" dirty="0">
+                <a:latin typeface="Segoe UI" panose="020B0502040204020203" pitchFamily="34" charset="0"/>
+                <a:cs typeface="Segoe UI" panose="020B0502040204020203" pitchFamily="34" charset="0"/>
+              </a:rPr>
+              <a:t>.</a:t>
+            </a:r>
+          </a:p>
+          <a:p>
+            <a:pPr lvl="1"/>
+            <a:r>
+              <a:rPr lang="en-US" sz="2000" dirty="0" err="1">
+                <a:latin typeface="Segoe UI" panose="020B0502040204020203" pitchFamily="34" charset="0"/>
+                <a:cs typeface="Segoe UI" panose="020B0502040204020203" pitchFamily="34" charset="0"/>
+              </a:rPr>
+              <a:t>Testcontainers</a:t>
+            </a:r>
+            <a:r>
+              <a:rPr lang="en-US" sz="2000" dirty="0">
+                <a:latin typeface="Segoe UI" panose="020B0502040204020203" pitchFamily="34" charset="0"/>
+                <a:cs typeface="Segoe UI" panose="020B0502040204020203" pitchFamily="34" charset="0"/>
+              </a:rPr>
+              <a:t>-dotnet</a:t>
+            </a:r>
+            <a:r>
+              <a:rPr lang="ru-RU" sz="2000" dirty="0">
+                <a:latin typeface="Segoe UI" panose="020B0502040204020203" pitchFamily="34" charset="0"/>
+                <a:cs typeface="Segoe UI" panose="020B0502040204020203" pitchFamily="34" charset="0"/>
+              </a:rPr>
+              <a:t>.</a:t>
+            </a:r>
+            <a:endParaRPr kumimoji="0" lang="en-US" sz="2000" b="0" i="0" u="none" strike="noStrike" kern="1200" cap="none" spc="0" normalizeH="0" baseline="0" noProof="0" dirty="0">
+              <a:ln>
+                <a:noFill/>
+              </a:ln>
+              <a:solidFill>
+                <a:prstClr val="black"/>
+              </a:solidFill>
+              <a:effectLst/>
+              <a:uLnTx/>
+              <a:uFillTx/>
+              <a:latin typeface="Calibri" panose="020F0502020204030204"/>
+              <a:ea typeface="+mn-ea"/>
+              <a:cs typeface="+mn-cs"/>
+            </a:endParaRPr>
+          </a:p>
+          <a:p>
+            <a:pPr lvl="0">
+              <a:buFont typeface="Wingdings" panose="05000000000000000000" pitchFamily="2" charset="2"/>
+              <a:buChar char="ü"/>
+              <a:defRPr/>
+            </a:pPr>
+            <a:r>
+              <a:rPr kumimoji="0" lang="en-US" sz="2400" b="0" i="0" u="none" strike="noStrike" kern="1200" cap="none" spc="0" normalizeH="0" baseline="0" noProof="0" dirty="0">
+                <a:ln>
+                  <a:noFill/>
+                </a:ln>
+                <a:solidFill>
+                  <a:prstClr val="black"/>
+                </a:solidFill>
+                <a:effectLst/>
+                <a:uLnTx/>
+                <a:uFillTx/>
+                <a:latin typeface="Calibri" panose="020F0502020204030204"/>
+                <a:ea typeface="+mn-ea"/>
+                <a:cs typeface="+mn-cs"/>
+              </a:rPr>
+              <a:t> </a:t>
+            </a:r>
+            <a:r>
+              <a:rPr lang="ru-RU" sz="2400" dirty="0">
+                <a:solidFill>
+                  <a:prstClr val="black"/>
+                </a:solidFill>
+              </a:rPr>
+              <a:t>Рекомендации</a:t>
+            </a:r>
+            <a:endParaRPr kumimoji="0" lang="ru-RU" sz="2400" b="0" i="0" u="none" strike="noStrike" kern="1200" cap="none" spc="0" normalizeH="0" baseline="0" noProof="0" dirty="0">
+              <a:ln>
+                <a:noFill/>
+              </a:ln>
+              <a:solidFill>
+                <a:prstClr val="black"/>
+              </a:solidFill>
+              <a:effectLst/>
+              <a:uLnTx/>
+              <a:uFillTx/>
+              <a:latin typeface="Calibri" panose="020F0502020204030204"/>
+              <a:ea typeface="+mn-ea"/>
+              <a:cs typeface="+mn-cs"/>
+            </a:endParaRPr>
           </a:p>
           <a:p>
             <a:pPr marL="685800" marR="0" lvl="1" indent="-228600" algn="l" defTabSz="914400" rtl="0" eaLnBrk="1" fontAlgn="auto" latinLnBrk="0" hangingPunct="1">
@@ -41169,157 +41526,12 @@
                 <a:effectLst/>
                 <a:uLnTx/>
                 <a:uFillTx/>
-                <a:latin typeface="Segoe UI" panose="020B0502040204020203" pitchFamily="34" charset="0"/>
-                <a:ea typeface="+mn-ea"/>
-                <a:cs typeface="+mn-cs"/>
-              </a:rPr>
-              <a:t>Исключения – возможная потеря данных</a:t>
-            </a:r>
-          </a:p>
-          <a:p>
-            <a:pPr>
-              <a:buFont typeface="Wingdings" panose="05000000000000000000" pitchFamily="2" charset="2"/>
-              <a:buChar char="ü"/>
-            </a:pPr>
-            <a:r>
-              <a:rPr lang="ru-RU" dirty="0"/>
-              <a:t>Изоляция тестов</a:t>
-            </a:r>
-          </a:p>
-          <a:p>
-            <a:pPr lvl="1"/>
-            <a:r>
-              <a:rPr lang="ru-RU" dirty="0"/>
-              <a:t>У каждого разработчика должна быть своя база</a:t>
-            </a:r>
-          </a:p>
-          <a:p>
-            <a:pPr lvl="1"/>
-            <a:r>
-              <a:rPr lang="ru-RU" dirty="0"/>
-              <a:t>Очищаем данные перед каждым тестом</a:t>
-            </a:r>
-            <a:endParaRPr lang="en-US" dirty="0"/>
-          </a:p>
-          <a:p>
-            <a:pPr>
-              <a:buFont typeface="Wingdings" panose="05000000000000000000" pitchFamily="2" charset="2"/>
-              <a:buChar char="ü"/>
-              <a:defRPr/>
-            </a:pPr>
-            <a:r>
-              <a:rPr lang="ru-RU" sz="2400" dirty="0">
-                <a:latin typeface="Segoe UI" panose="020B0502040204020203" pitchFamily="34" charset="0"/>
-                <a:cs typeface="Segoe UI" panose="020B0502040204020203" pitchFamily="34" charset="0"/>
-              </a:rPr>
-              <a:t>Библиотеки</a:t>
-            </a:r>
-            <a:endParaRPr lang="ru-RU" sz="2400" dirty="0">
-              <a:solidFill>
-                <a:prstClr val="black"/>
-              </a:solidFill>
-            </a:endParaRPr>
-          </a:p>
-          <a:p>
-            <a:pPr lvl="1"/>
-            <a:r>
-              <a:rPr lang="en-US" sz="2000" dirty="0">
-                <a:latin typeface="Segoe UI" panose="020B0502040204020203" pitchFamily="34" charset="0"/>
-                <a:cs typeface="Segoe UI" panose="020B0502040204020203" pitchFamily="34" charset="0"/>
-              </a:rPr>
-              <a:t>Respawn</a:t>
-            </a:r>
-          </a:p>
-          <a:p>
-            <a:pPr lvl="1"/>
-            <a:r>
-              <a:rPr lang="ru-RU" sz="2000" dirty="0" err="1">
-                <a:latin typeface="Segoe UI" panose="020B0502040204020203" pitchFamily="34" charset="0"/>
-                <a:cs typeface="Segoe UI" panose="020B0502040204020203" pitchFamily="34" charset="0"/>
-              </a:rPr>
-              <a:t>EfCore.TestSupport</a:t>
-            </a:r>
-            <a:endParaRPr lang="ru-RU" sz="2000" dirty="0">
-              <a:latin typeface="Segoe UI" panose="020B0502040204020203" pitchFamily="34" charset="0"/>
-              <a:cs typeface="Segoe UI" panose="020B0502040204020203" pitchFamily="34" charset="0"/>
-            </a:endParaRPr>
-          </a:p>
-          <a:p>
-            <a:pPr lvl="1"/>
-            <a:r>
-              <a:rPr lang="en-US" sz="2000" dirty="0" err="1">
-                <a:latin typeface="Segoe UI" panose="020B0502040204020203" pitchFamily="34" charset="0"/>
-                <a:cs typeface="Segoe UI" panose="020B0502040204020203" pitchFamily="34" charset="0"/>
-              </a:rPr>
-              <a:t>Testcontainers</a:t>
-            </a:r>
-            <a:r>
-              <a:rPr lang="en-US" sz="2000" dirty="0">
-                <a:latin typeface="Segoe UI" panose="020B0502040204020203" pitchFamily="34" charset="0"/>
-                <a:cs typeface="Segoe UI" panose="020B0502040204020203" pitchFamily="34" charset="0"/>
-              </a:rPr>
-              <a:t>-dotnet</a:t>
-            </a:r>
-            <a:endParaRPr kumimoji="0" lang="en-US" sz="2000" b="0" i="0" u="none" strike="noStrike" kern="1200" cap="none" spc="0" normalizeH="0" baseline="0" noProof="0" dirty="0">
-              <a:ln>
-                <a:noFill/>
-              </a:ln>
-              <a:solidFill>
-                <a:prstClr val="black"/>
-              </a:solidFill>
-              <a:effectLst/>
-              <a:uLnTx/>
-              <a:uFillTx/>
-              <a:latin typeface="Calibri" panose="020F0502020204030204"/>
-              <a:ea typeface="+mn-ea"/>
-              <a:cs typeface="+mn-cs"/>
-            </a:endParaRPr>
-          </a:p>
-          <a:p>
-            <a:pPr lvl="0">
-              <a:buFont typeface="Wingdings" panose="05000000000000000000" pitchFamily="2" charset="2"/>
-              <a:buChar char="ü"/>
-              <a:defRPr/>
-            </a:pPr>
-            <a:r>
-              <a:rPr kumimoji="0" lang="en-US" sz="2400" b="0" i="0" u="none" strike="noStrike" kern="1200" cap="none" spc="0" normalizeH="0" baseline="0" noProof="0" dirty="0">
-                <a:ln>
-                  <a:noFill/>
-                </a:ln>
-                <a:solidFill>
-                  <a:prstClr val="black"/>
-                </a:solidFill>
-                <a:effectLst/>
-                <a:uLnTx/>
-                <a:uFillTx/>
                 <a:latin typeface="Calibri" panose="020F0502020204030204"/>
                 <a:ea typeface="+mn-ea"/>
                 <a:cs typeface="+mn-cs"/>
               </a:rPr>
-              <a:t> </a:t>
-            </a:r>
-            <a:r>
-              <a:rPr lang="ru-RU" sz="2400" dirty="0">
-                <a:solidFill>
-                  <a:prstClr val="black"/>
-                </a:solidFill>
-              </a:rPr>
-              <a:t>Рекомендации</a:t>
-            </a:r>
-            <a:endParaRPr kumimoji="0" lang="ru-RU" sz="2400" b="0" i="0" u="none" strike="noStrike" kern="1200" cap="none" spc="0" normalizeH="0" baseline="0" noProof="0" dirty="0">
-              <a:ln>
-                <a:noFill/>
-              </a:ln>
-              <a:solidFill>
-                <a:prstClr val="black"/>
-              </a:solidFill>
-              <a:effectLst/>
-              <a:uLnTx/>
-              <a:uFillTx/>
-              <a:latin typeface="Calibri" panose="020F0502020204030204"/>
-              <a:ea typeface="+mn-ea"/>
-              <a:cs typeface="+mn-cs"/>
-            </a:endParaRPr>
+              <a:t>Не тестируем чтения.</a:t>
+            </a:r>
           </a:p>
           <a:p>
             <a:pPr marL="685800" marR="0" lvl="1" indent="-228600" algn="l" defTabSz="914400" rtl="0" eaLnBrk="1" fontAlgn="auto" latinLnBrk="0" hangingPunct="1">
@@ -41354,43 +41566,7 @@
                 <a:ea typeface="+mn-ea"/>
                 <a:cs typeface="+mn-cs"/>
               </a:rPr>
-              <a:t>Не тестируем чтения</a:t>
-            </a:r>
-          </a:p>
-          <a:p>
-            <a:pPr marL="685800" marR="0" lvl="1" indent="-228600" algn="l" defTabSz="914400" rtl="0" eaLnBrk="1" fontAlgn="auto" latinLnBrk="0" hangingPunct="1">
-              <a:lnSpc>
-                <a:spcPct val="90000"/>
-              </a:lnSpc>
-              <a:spcBef>
-                <a:spcPts val="500"/>
-              </a:spcBef>
-              <a:spcAft>
-                <a:spcPts val="0"/>
-              </a:spcAft>
-              <a:buClrTx/>
-              <a:buSzTx/>
-              <a:buFont typeface="Arial" panose="020B0604020202020204" pitchFamily="34" charset="0"/>
-              <a:buChar char="•"/>
-              <a:tabLst/>
-              <a:defRPr/>
-            </a:pPr>
-            <a:r>
-              <a:rPr kumimoji="0" lang="ru-RU" sz="2000" b="0" i="0" u="none" strike="noStrike" kern="1200" cap="none" spc="0" normalizeH="0" baseline="0" noProof="0" dirty="0">
-                <a:ln>
-                  <a:noFill/>
-                </a:ln>
-                <a:solidFill>
-                  <a:prstClr val="black"/>
-                </a:solidFill>
-                <a:effectLst/>
-                <a:uLnTx/>
-                <a:uFillTx/>
-                <a:latin typeface="Calibri" panose="020F0502020204030204"/>
-                <a:ea typeface="+mn-ea"/>
-                <a:cs typeface="+mn-cs"/>
-              </a:rPr>
-              <a:t>Не пишем модульные тесты на репозитории</a:t>
+              <a:t>Не пишем модульные тесты на репозитории.</a:t>
             </a:r>
             <a:endParaRPr kumimoji="0" lang="en-US" sz="2000" b="0" i="0" u="none" strike="noStrike" kern="1200" cap="none" spc="0" normalizeH="0" baseline="0" noProof="0" dirty="0">
               <a:ln>
@@ -42624,7 +42800,7 @@
                 <a:latin typeface="Segoe UI" panose="020B0502040204020203" pitchFamily="34" charset="0"/>
                 <a:cs typeface="Segoe UI" panose="020B0502040204020203" pitchFamily="34" charset="0"/>
               </a:rPr>
-              <a:t>Сосредоточьтесь исключительно на модульном тестировании модели предметной области</a:t>
+              <a:t>Сосредоточьтесь исключительно на модульном тестировании модели предметной области.</a:t>
             </a:r>
             <a:endParaRPr lang="en-US" dirty="0">
               <a:latin typeface="Segoe UI" panose="020B0502040204020203" pitchFamily="34" charset="0"/>
@@ -43396,27 +43572,27 @@
             </a:endParaRPr>
           </a:p>
           <a:p>
-            <a:pPr lvl="1" algn="just"/>
+            <a:pPr lvl="1"/>
             <a:r>
               <a:rPr lang="ru-RU" dirty="0">
                 <a:latin typeface="Segoe UI" panose="020B0502040204020203" pitchFamily="34" charset="0"/>
                 <a:cs typeface="Segoe UI" panose="020B0502040204020203" pitchFamily="34" charset="0"/>
               </a:rPr>
-              <a:t>База данных – управляемая зависимость, а значит деталь реализации</a:t>
-            </a:r>
-          </a:p>
-          <a:p>
-            <a:pPr lvl="1" algn="just"/>
+              <a:t>База данных – управляемая зависимость, а значит деталь реализации.</a:t>
+            </a:r>
+          </a:p>
+          <a:p>
+            <a:pPr lvl="1"/>
             <a:r>
               <a:rPr lang="ru-RU" dirty="0">
                 <a:latin typeface="Segoe UI" panose="020B0502040204020203" pitchFamily="34" charset="0"/>
                 <a:cs typeface="Segoe UI" panose="020B0502040204020203" pitchFamily="34" charset="0"/>
               </a:rPr>
-              <a:t>Необходимо выделять управляемую часть из неуправляемого взаимодействия с базой</a:t>
-            </a:r>
-          </a:p>
-          <a:p>
-            <a:pPr lvl="1" algn="just"/>
+              <a:t>Необходимо выделять управляемую часть из неуправляемого взаимодействия с базой.</a:t>
+            </a:r>
+          </a:p>
+          <a:p>
+            <a:pPr lvl="1"/>
             <a:r>
               <a:rPr lang="ru-RU" dirty="0">
                 <a:latin typeface="Segoe UI" panose="020B0502040204020203" pitchFamily="34" charset="0"/>
@@ -43436,7 +43612,7 @@
                 <a:latin typeface="Segoe UI" panose="020B0502040204020203" pitchFamily="34" charset="0"/>
                 <a:cs typeface="Segoe UI" panose="020B0502040204020203" pitchFamily="34" charset="0"/>
               </a:rPr>
-              <a:t>) </a:t>
+              <a:t>).</a:t>
             </a:r>
             <a:endParaRPr lang="en-US" dirty="0">
               <a:latin typeface="Segoe UI" panose="020B0502040204020203" pitchFamily="34" charset="0"/>

</xml_diff>